<commit_message>
Add section 3 to powerpoint, edited README to correspond the same refs
</commit_message>
<xml_diff>
--- a/Presentation1.pptx
+++ b/Presentation1.pptx
@@ -11,6 +11,8 @@
     <p:sldId id="259" r:id="rId5"/>
     <p:sldId id="260" r:id="rId6"/>
     <p:sldId id="261" r:id="rId7"/>
+    <p:sldId id="262" r:id="rId8"/>
+    <p:sldId id="263" r:id="rId9"/>
   </p:sldIdLst>
   <p:sldSz cx="12192000" cy="6858000"/>
   <p:notesSz cx="6858000" cy="9144000"/>
@@ -3421,20 +3423,13 @@
         <p:spPr/>
         <p:txBody>
           <a:bodyPr>
-            <a:normAutofit fontScale="90000"/>
+            <a:normAutofit/>
           </a:bodyPr>
           <a:lstStyle/>
           <a:p>
             <a:r>
               <a:rPr lang="en-US" dirty="0"/>
-              <a:t>Version control:  </a:t>
-            </a:r>
-            <a:br>
-              <a:rPr lang="en-US" dirty="0"/>
-            </a:br>
-            <a:r>
-              <a:rPr lang="en-US" dirty="0"/>
-              <a:t>Like track changes &amp; version history</a:t>
+              <a:t>Version Control</a:t>
             </a:r>
           </a:p>
         </p:txBody>
@@ -3462,24 +3457,32 @@
           <a:p>
             <a:r>
               <a:rPr lang="en-US" dirty="0"/>
+              <a:t>Like track changes &amp; version history</a:t>
+            </a:r>
+          </a:p>
+          <a:p>
+            <a:pPr lvl="2"/>
+            <a:r>
+              <a:rPr lang="en-US" dirty="0"/>
               <a:t>Microsoft Word </a:t>
             </a:r>
           </a:p>
           <a:p>
-            <a:pPr lvl="1"/>
+            <a:pPr lvl="3"/>
             <a:r>
               <a:rPr lang="en-US" dirty="0"/>
               <a:t>Changes are highlighted, and you know who did it (ideally)</a:t>
             </a:r>
           </a:p>
           <a:p>
+            <a:pPr lvl="2"/>
             <a:r>
               <a:rPr lang="en-US" dirty="0"/>
               <a:t>Google-doc/Wikipedia </a:t>
             </a:r>
           </a:p>
           <a:p>
-            <a:pPr lvl="1"/>
+            <a:pPr lvl="3"/>
             <a:r>
               <a:rPr lang="en-US" dirty="0"/>
               <a:t>All changes are recorded, and you can go back to see how things were like before a certain change. </a:t>
@@ -3783,18 +3786,39 @@
         </p:nvSpPr>
         <p:spPr/>
         <p:txBody>
-          <a:bodyPr/>
+          <a:bodyPr>
+            <a:normAutofit/>
+          </a:bodyPr>
           <a:lstStyle/>
           <a:p>
             <a:r>
               <a:rPr lang="en-US" dirty="0"/>
-              <a:t>2. </a:t>
-            </a:r>
-            <a:r>
-              <a:rPr lang="en-US"/>
-              <a:t>Creating a repository</a:t>
-            </a:r>
-            <a:endParaRPr lang="en-US" dirty="0"/>
+              <a:t>2. Creating a repository</a:t>
+            </a:r>
+            <a:br>
+              <a:rPr lang="en-US" dirty="0"/>
+            </a:br>
+            <a:r>
+              <a:rPr lang="en-US" sz="2400" dirty="0">
+                <a:latin typeface="Monaco" pitchFamily="2" charset="77"/>
+              </a:rPr>
+              <a:t>&gt; </a:t>
+            </a:r>
+            <a:r>
+              <a:rPr lang="en-US" sz="2400" b="1" dirty="0">
+                <a:latin typeface="Monaco" pitchFamily="2" charset="77"/>
+              </a:rPr>
+              <a:t>git </a:t>
+            </a:r>
+            <a:r>
+              <a:rPr lang="en-US" sz="2400" b="1" dirty="0" err="1">
+                <a:latin typeface="Monaco" pitchFamily="2" charset="77"/>
+              </a:rPr>
+              <a:t>init</a:t>
+            </a:r>
+            <a:endParaRPr lang="en-US" sz="2400" b="1" dirty="0">
+              <a:latin typeface="Monaco" pitchFamily="2" charset="77"/>
+            </a:endParaRPr>
           </a:p>
         </p:txBody>
       </p:sp>
@@ -3819,6 +3843,156 @@
           <a:bodyPr/>
           <a:lstStyle/>
           <a:p>
+            <a:pPr marL="0" indent="0">
+              <a:buNone/>
+            </a:pPr>
+            <a:r>
+              <a:rPr lang="en-US" dirty="0"/>
+              <a:t>2.1 – Create a directory in your Desktop</a:t>
+            </a:r>
+          </a:p>
+          <a:p>
+            <a:pPr marL="0" indent="0">
+              <a:buNone/>
+            </a:pPr>
+            <a:r>
+              <a:rPr lang="en-US" sz="2800" dirty="0">
+                <a:solidFill>
+                  <a:srgbClr val="C00000"/>
+                </a:solidFill>
+              </a:rPr>
+              <a:t>		&gt; </a:t>
+            </a:r>
+            <a:r>
+              <a:rPr lang="en-US" sz="2800" dirty="0" err="1">
+                <a:solidFill>
+                  <a:srgbClr val="C00000"/>
+                </a:solidFill>
+                <a:latin typeface="Monaco" pitchFamily="2" charset="77"/>
+              </a:rPr>
+              <a:t>mkdir</a:t>
+            </a:r>
+            <a:r>
+              <a:rPr lang="en-US" sz="2800" dirty="0">
+                <a:solidFill>
+                  <a:srgbClr val="C00000"/>
+                </a:solidFill>
+                <a:latin typeface="Monaco" pitchFamily="2" charset="77"/>
+              </a:rPr>
+              <a:t> ~/Desktop/</a:t>
+            </a:r>
+            <a:r>
+              <a:rPr lang="en-US" sz="2800" dirty="0" err="1">
+                <a:solidFill>
+                  <a:srgbClr val="C00000"/>
+                </a:solidFill>
+                <a:latin typeface="Monaco" pitchFamily="2" charset="77"/>
+              </a:rPr>
+              <a:t>workdir</a:t>
+            </a:r>
+            <a:endParaRPr lang="en-US" sz="2800" dirty="0">
+              <a:solidFill>
+                <a:srgbClr val="C00000"/>
+              </a:solidFill>
+              <a:latin typeface="Monaco" pitchFamily="2" charset="77"/>
+            </a:endParaRPr>
+          </a:p>
+          <a:p>
+            <a:pPr marL="0" indent="0">
+              <a:buNone/>
+            </a:pPr>
+            <a:r>
+              <a:rPr lang="en-US" sz="2800" dirty="0">
+                <a:solidFill>
+                  <a:srgbClr val="C00000"/>
+                </a:solidFill>
+              </a:rPr>
+              <a:t>		&gt; </a:t>
+            </a:r>
+            <a:r>
+              <a:rPr lang="en-US" sz="2800" dirty="0">
+                <a:solidFill>
+                  <a:srgbClr val="C00000"/>
+                </a:solidFill>
+                <a:latin typeface="Monaco" pitchFamily="2" charset="77"/>
+              </a:rPr>
+              <a:t>cd ~/Desktop/</a:t>
+            </a:r>
+            <a:r>
+              <a:rPr lang="en-US" sz="2800" dirty="0" err="1">
+                <a:solidFill>
+                  <a:srgbClr val="C00000"/>
+                </a:solidFill>
+                <a:latin typeface="Monaco" pitchFamily="2" charset="77"/>
+              </a:rPr>
+              <a:t>workdir</a:t>
+            </a:r>
+            <a:endParaRPr lang="en-US" sz="2800" dirty="0">
+              <a:solidFill>
+                <a:srgbClr val="C00000"/>
+              </a:solidFill>
+              <a:latin typeface="Monaco" pitchFamily="2" charset="77"/>
+            </a:endParaRPr>
+          </a:p>
+          <a:p>
+            <a:pPr marL="0" indent="0">
+              <a:buNone/>
+            </a:pPr>
+            <a:endParaRPr lang="en-US" dirty="0"/>
+          </a:p>
+          <a:p>
+            <a:pPr marL="0" indent="0">
+              <a:buNone/>
+            </a:pPr>
+            <a:r>
+              <a:rPr lang="en-US" dirty="0"/>
+              <a:t>2.2 – Create a </a:t>
+            </a:r>
+            <a:r>
+              <a:rPr lang="en-US" b="1" dirty="0"/>
+              <a:t>repository</a:t>
+            </a:r>
+            <a:r>
+              <a:rPr lang="en-US" dirty="0"/>
+              <a:t> (stores the versions of your files)</a:t>
+            </a:r>
+          </a:p>
+          <a:p>
+            <a:pPr marL="0" indent="0">
+              <a:buNone/>
+            </a:pPr>
+            <a:r>
+              <a:rPr lang="en-US" sz="2800" dirty="0">
+                <a:solidFill>
+                  <a:srgbClr val="C00000"/>
+                </a:solidFill>
+              </a:rPr>
+              <a:t>		&gt; </a:t>
+            </a:r>
+            <a:r>
+              <a:rPr lang="en-US" sz="2800" dirty="0">
+                <a:solidFill>
+                  <a:srgbClr val="C00000"/>
+                </a:solidFill>
+                <a:latin typeface="Monaco" pitchFamily="2" charset="77"/>
+              </a:rPr>
+              <a:t>git </a:t>
+            </a:r>
+            <a:r>
+              <a:rPr lang="en-US" sz="2800" dirty="0" err="1">
+                <a:solidFill>
+                  <a:srgbClr val="C00000"/>
+                </a:solidFill>
+                <a:latin typeface="Monaco" pitchFamily="2" charset="77"/>
+              </a:rPr>
+              <a:t>init</a:t>
+            </a:r>
+            <a:endParaRPr lang="en-US" sz="2800" dirty="0"/>
+          </a:p>
+          <a:p>
+            <a:pPr marL="0" indent="0">
+              <a:buNone/>
+            </a:pPr>
             <a:endParaRPr lang="en-US" dirty="0"/>
           </a:p>
         </p:txBody>
@@ -3827,6 +4001,354 @@
     <p:extLst>
       <p:ext uri="{BB962C8B-B14F-4D97-AF65-F5344CB8AC3E}">
         <p14:creationId xmlns:p14="http://schemas.microsoft.com/office/powerpoint/2010/main" val="2143766347"/>
+      </p:ext>
+    </p:extLst>
+  </p:cSld>
+  <p:clrMapOvr>
+    <a:masterClrMapping/>
+  </p:clrMapOvr>
+</p:sld>
+</file>
+
+<file path=ppt/slides/slide7.xml><?xml version="1.0" encoding="utf-8"?>
+<p:sld xmlns:a="http://schemas.openxmlformats.org/drawingml/2006/main" xmlns:r="http://schemas.openxmlformats.org/officeDocument/2006/relationships" xmlns:p="http://schemas.openxmlformats.org/presentationml/2006/main">
+  <p:cSld>
+    <p:spTree>
+      <p:nvGrpSpPr>
+        <p:cNvPr id="1" name=""/>
+        <p:cNvGrpSpPr/>
+        <p:nvPr/>
+      </p:nvGrpSpPr>
+      <p:grpSpPr>
+        <a:xfrm>
+          <a:off x="0" y="0"/>
+          <a:ext cx="0" cy="0"/>
+          <a:chOff x="0" y="0"/>
+          <a:chExt cx="0" cy="0"/>
+        </a:xfrm>
+      </p:grpSpPr>
+      <p:sp>
+        <p:nvSpPr>
+          <p:cNvPr id="2" name="Title 1">
+            <a:extLst>
+              <a:ext uri="{FF2B5EF4-FFF2-40B4-BE49-F238E27FC236}">
+                <a16:creationId xmlns:a16="http://schemas.microsoft.com/office/drawing/2014/main" id="{E171E2D6-216C-6648-8A7E-8983681B1F06}"/>
+              </a:ext>
+            </a:extLst>
+          </p:cNvPr>
+          <p:cNvSpPr>
+            <a:spLocks noGrp="1"/>
+          </p:cNvSpPr>
+          <p:nvPr>
+            <p:ph type="title"/>
+          </p:nvPr>
+        </p:nvSpPr>
+        <p:spPr/>
+        <p:txBody>
+          <a:bodyPr>
+            <a:normAutofit/>
+          </a:bodyPr>
+          <a:lstStyle/>
+          <a:p>
+            <a:r>
+              <a:rPr lang="en-US" dirty="0"/>
+              <a:t>3. Tracking Changes</a:t>
+            </a:r>
+            <a:br>
+              <a:rPr lang="en-US" dirty="0"/>
+            </a:br>
+            <a:r>
+              <a:rPr lang="en-US" sz="2400" dirty="0">
+                <a:latin typeface="Monaco" pitchFamily="2" charset="77"/>
+              </a:rPr>
+              <a:t>&gt; </a:t>
+            </a:r>
+            <a:r>
+              <a:rPr lang="en-US" sz="2400" b="1" dirty="0">
+                <a:latin typeface="Monaco" pitchFamily="2" charset="77"/>
+              </a:rPr>
+              <a:t>git</a:t>
+            </a:r>
+            <a:r>
+              <a:rPr lang="en-US" sz="2400" dirty="0">
+                <a:latin typeface="Monaco" pitchFamily="2" charset="77"/>
+              </a:rPr>
+              <a:t> </a:t>
+            </a:r>
+            <a:r>
+              <a:rPr lang="en-US" sz="2400" b="1" dirty="0">
+                <a:latin typeface="Monaco" pitchFamily="2" charset="77"/>
+              </a:rPr>
+              <a:t>add, commit</a:t>
+            </a:r>
+            <a:endParaRPr lang="en-US" sz="2400" dirty="0">
+              <a:latin typeface="Monaco" pitchFamily="2" charset="77"/>
+            </a:endParaRPr>
+          </a:p>
+        </p:txBody>
+      </p:sp>
+      <p:sp>
+        <p:nvSpPr>
+          <p:cNvPr id="3" name="Content Placeholder 2">
+            <a:extLst>
+              <a:ext uri="{FF2B5EF4-FFF2-40B4-BE49-F238E27FC236}">
+                <a16:creationId xmlns:a16="http://schemas.microsoft.com/office/drawing/2014/main" id="{8EDF34F1-5F16-9D4D-8698-88959651B81B}"/>
+              </a:ext>
+            </a:extLst>
+          </p:cNvPr>
+          <p:cNvSpPr>
+            <a:spLocks noGrp="1"/>
+          </p:cNvSpPr>
+          <p:nvPr>
+            <p:ph idx="1"/>
+          </p:nvPr>
+        </p:nvSpPr>
+        <p:spPr>
+          <a:xfrm>
+            <a:off x="182795" y="1248385"/>
+            <a:ext cx="11814383" cy="3291342"/>
+          </a:xfrm>
+        </p:spPr>
+        <p:txBody>
+          <a:bodyPr/>
+          <a:lstStyle/>
+          <a:p>
+            <a:pPr marL="0" indent="0">
+              <a:buNone/>
+            </a:pPr>
+            <a:r>
+              <a:rPr lang="en-US" dirty="0"/>
+              <a:t>3.1 – Adding new files/modification to </a:t>
+            </a:r>
+            <a:r>
+              <a:rPr lang="en-US" b="1" dirty="0"/>
+              <a:t>staging area</a:t>
+            </a:r>
+          </a:p>
+          <a:p>
+            <a:pPr marL="0" indent="0">
+              <a:buNone/>
+            </a:pPr>
+            <a:r>
+              <a:rPr lang="en-US" sz="2800" dirty="0">
+                <a:solidFill>
+                  <a:srgbClr val="C00000"/>
+                </a:solidFill>
+              </a:rPr>
+              <a:t>		</a:t>
+            </a:r>
+            <a:r>
+              <a:rPr lang="en-US" sz="2800" dirty="0">
+                <a:solidFill>
+                  <a:srgbClr val="C00000"/>
+                </a:solidFill>
+                <a:latin typeface="Monaco" pitchFamily="2" charset="77"/>
+              </a:rPr>
+              <a:t>&gt; git add</a:t>
+            </a:r>
+          </a:p>
+          <a:p>
+            <a:pPr marL="0" indent="0">
+              <a:buNone/>
+            </a:pPr>
+            <a:r>
+              <a:rPr lang="en-US" dirty="0"/>
+              <a:t>3.2 – Saving these changes to the </a:t>
+            </a:r>
+            <a:r>
+              <a:rPr lang="en-US" b="1" dirty="0"/>
+              <a:t>repository</a:t>
+            </a:r>
+          </a:p>
+          <a:p>
+            <a:pPr marL="0" indent="0">
+              <a:buNone/>
+            </a:pPr>
+            <a:r>
+              <a:rPr lang="en-US" sz="2800" dirty="0">
+                <a:solidFill>
+                  <a:srgbClr val="C00000"/>
+                </a:solidFill>
+              </a:rPr>
+              <a:t>		</a:t>
+            </a:r>
+            <a:r>
+              <a:rPr lang="en-US" sz="2800" dirty="0">
+                <a:solidFill>
+                  <a:srgbClr val="C00000"/>
+                </a:solidFill>
+                <a:latin typeface="Monaco" pitchFamily="2" charset="77"/>
+              </a:rPr>
+              <a:t>&gt; git commit</a:t>
+            </a:r>
+          </a:p>
+          <a:p>
+            <a:pPr marL="0" indent="0">
+              <a:buNone/>
+            </a:pPr>
+            <a:r>
+              <a:rPr lang="en-US" dirty="0"/>
+              <a:t>BONUS – Checking what has changed before add/commit</a:t>
+            </a:r>
+          </a:p>
+          <a:p>
+            <a:pPr marL="0" indent="0">
+              <a:buNone/>
+            </a:pPr>
+            <a:r>
+              <a:rPr lang="en-US" sz="2800" dirty="0">
+                <a:solidFill>
+                  <a:srgbClr val="C00000"/>
+                </a:solidFill>
+              </a:rPr>
+              <a:t>		</a:t>
+            </a:r>
+            <a:r>
+              <a:rPr lang="en-US" sz="2800" dirty="0">
+                <a:solidFill>
+                  <a:srgbClr val="C00000"/>
+                </a:solidFill>
+                <a:latin typeface="Monaco" pitchFamily="2" charset="77"/>
+              </a:rPr>
+              <a:t>&gt; git diff</a:t>
+            </a:r>
+          </a:p>
+          <a:p>
+            <a:pPr marL="0" indent="0">
+              <a:buNone/>
+            </a:pPr>
+            <a:endParaRPr lang="en-US" dirty="0"/>
+          </a:p>
+        </p:txBody>
+      </p:sp>
+      <p:pic>
+        <p:nvPicPr>
+          <p:cNvPr id="4" name="Picture 3">
+            <a:extLst>
+              <a:ext uri="{FF2B5EF4-FFF2-40B4-BE49-F238E27FC236}">
+                <a16:creationId xmlns:a16="http://schemas.microsoft.com/office/drawing/2014/main" id="{66999947-8CB4-B94C-A55B-C3E8A293356C}"/>
+              </a:ext>
+            </a:extLst>
+          </p:cNvPr>
+          <p:cNvPicPr>
+            <a:picLocks noChangeAspect="1"/>
+          </p:cNvPicPr>
+          <p:nvPr/>
+        </p:nvPicPr>
+        <p:blipFill>
+          <a:blip r:embed="rId2"/>
+          <a:stretch>
+            <a:fillRect/>
+          </a:stretch>
+        </p:blipFill>
+        <p:spPr>
+          <a:xfrm>
+            <a:off x="4502225" y="4089400"/>
+            <a:ext cx="7899400" cy="2768600"/>
+          </a:xfrm>
+          <a:prstGeom prst="rect">
+            <a:avLst/>
+          </a:prstGeom>
+        </p:spPr>
+      </p:pic>
+    </p:spTree>
+    <p:extLst>
+      <p:ext uri="{BB962C8B-B14F-4D97-AF65-F5344CB8AC3E}">
+        <p14:creationId xmlns:p14="http://schemas.microsoft.com/office/powerpoint/2010/main" val="1626759077"/>
+      </p:ext>
+    </p:extLst>
+  </p:cSld>
+  <p:clrMapOvr>
+    <a:masterClrMapping/>
+  </p:clrMapOvr>
+</p:sld>
+</file>
+
+<file path=ppt/slides/slide8.xml><?xml version="1.0" encoding="utf-8"?>
+<p:sld xmlns:a="http://schemas.openxmlformats.org/drawingml/2006/main" xmlns:r="http://schemas.openxmlformats.org/officeDocument/2006/relationships" xmlns:p="http://schemas.openxmlformats.org/presentationml/2006/main">
+  <p:cSld>
+    <p:spTree>
+      <p:nvGrpSpPr>
+        <p:cNvPr id="1" name=""/>
+        <p:cNvGrpSpPr/>
+        <p:nvPr/>
+      </p:nvGrpSpPr>
+      <p:grpSpPr>
+        <a:xfrm>
+          <a:off x="0" y="0"/>
+          <a:ext cx="0" cy="0"/>
+          <a:chOff x="0" y="0"/>
+          <a:chExt cx="0" cy="0"/>
+        </a:xfrm>
+      </p:grpSpPr>
+      <p:sp>
+        <p:nvSpPr>
+          <p:cNvPr id="2" name="Title 1">
+            <a:extLst>
+              <a:ext uri="{FF2B5EF4-FFF2-40B4-BE49-F238E27FC236}">
+                <a16:creationId xmlns:a16="http://schemas.microsoft.com/office/drawing/2014/main" id="{986499DB-8CBB-8141-BACC-28947438B354}"/>
+              </a:ext>
+            </a:extLst>
+          </p:cNvPr>
+          <p:cNvSpPr>
+            <a:spLocks noGrp="1"/>
+          </p:cNvSpPr>
+          <p:nvPr>
+            <p:ph type="title"/>
+          </p:nvPr>
+        </p:nvSpPr>
+        <p:spPr/>
+        <p:txBody>
+          <a:bodyPr>
+            <a:normAutofit/>
+          </a:bodyPr>
+          <a:lstStyle/>
+          <a:p>
+            <a:r>
+              <a:rPr lang="en-US" dirty="0"/>
+              <a:t>4. Exploring History</a:t>
+            </a:r>
+            <a:br>
+              <a:rPr lang="en-US" dirty="0"/>
+            </a:br>
+            <a:r>
+              <a:rPr lang="en-US" sz="2400" dirty="0">
+                <a:latin typeface="Monaco" pitchFamily="2" charset="77"/>
+              </a:rPr>
+              <a:t>&gt; git diff &amp; checkout</a:t>
+            </a:r>
+          </a:p>
+        </p:txBody>
+      </p:sp>
+      <p:sp>
+        <p:nvSpPr>
+          <p:cNvPr id="3" name="Content Placeholder 2">
+            <a:extLst>
+              <a:ext uri="{FF2B5EF4-FFF2-40B4-BE49-F238E27FC236}">
+                <a16:creationId xmlns:a16="http://schemas.microsoft.com/office/drawing/2014/main" id="{DDF15195-8335-6A4B-B958-7BDF4020BAA1}"/>
+              </a:ext>
+            </a:extLst>
+          </p:cNvPr>
+          <p:cNvSpPr>
+            <a:spLocks noGrp="1"/>
+          </p:cNvSpPr>
+          <p:nvPr>
+            <p:ph idx="1"/>
+          </p:nvPr>
+        </p:nvSpPr>
+        <p:spPr/>
+        <p:txBody>
+          <a:bodyPr/>
+          <a:lstStyle/>
+          <a:p>
+            <a:endParaRPr lang="en-US"/>
+          </a:p>
+        </p:txBody>
+      </p:sp>
+    </p:spTree>
+    <p:extLst>
+      <p:ext uri="{BB962C8B-B14F-4D97-AF65-F5344CB8AC3E}">
+        <p14:creationId xmlns:p14="http://schemas.microsoft.com/office/powerpoint/2010/main" val="2069254717"/>
       </p:ext>
     </p:extLst>
   </p:cSld>

</xml_diff>

<commit_message>
Add section 4 and 5 for Exploring History and Reverting Changes
</commit_message>
<xml_diff>
--- a/Presentation1.pptx
+++ b/Presentation1.pptx
@@ -13,6 +13,7 @@
     <p:sldId id="261" r:id="rId7"/>
     <p:sldId id="262" r:id="rId8"/>
     <p:sldId id="263" r:id="rId9"/>
+    <p:sldId id="264" r:id="rId10"/>
   </p:sldIdLst>
   <p:sldSz cx="12192000" cy="6858000"/>
   <p:notesSz cx="6858000" cy="9144000"/>
@@ -4105,23 +4106,25 @@
         </p:nvSpPr>
         <p:spPr>
           <a:xfrm>
-            <a:off x="182795" y="1248385"/>
-            <a:ext cx="11814383" cy="3291342"/>
+            <a:off x="182795" y="1248384"/>
+            <a:ext cx="11814383" cy="5609615"/>
           </a:xfrm>
         </p:spPr>
         <p:txBody>
-          <a:bodyPr/>
+          <a:bodyPr>
+            <a:normAutofit/>
+          </a:bodyPr>
           <a:lstStyle/>
           <a:p>
             <a:pPr marL="0" indent="0">
               <a:buNone/>
             </a:pPr>
             <a:r>
-              <a:rPr lang="en-US" dirty="0"/>
+              <a:rPr lang="en-US" sz="2800" dirty="0"/>
               <a:t>3.1 – Adding new files/modification to </a:t>
             </a:r>
             <a:r>
-              <a:rPr lang="en-US" b="1" dirty="0"/>
+              <a:rPr lang="en-US" sz="2800" b="1" dirty="0"/>
               <a:t>staging area</a:t>
             </a:r>
           </a:p>
@@ -4130,7 +4133,36 @@
               <a:buNone/>
             </a:pPr>
             <a:r>
-              <a:rPr lang="en-US" sz="2800" dirty="0">
+              <a:rPr lang="en-US" sz="2400" dirty="0">
+                <a:solidFill>
+                  <a:srgbClr val="C00000"/>
+                </a:solidFill>
+                <a:latin typeface="Monaco" pitchFamily="2" charset="77"/>
+              </a:rPr>
+              <a:t>		&gt; touch </a:t>
+            </a:r>
+            <a:r>
+              <a:rPr lang="en-US" sz="2400" dirty="0" err="1">
+                <a:solidFill>
+                  <a:srgbClr val="C00000"/>
+                </a:solidFill>
+                <a:latin typeface="Monaco" pitchFamily="2" charset="77"/>
+              </a:rPr>
+              <a:t>foo.txt</a:t>
+            </a:r>
+            <a:endParaRPr lang="en-US" sz="2400" dirty="0">
+              <a:solidFill>
+                <a:srgbClr val="C00000"/>
+              </a:solidFill>
+              <a:latin typeface="Monaco" pitchFamily="2" charset="77"/>
+            </a:endParaRPr>
+          </a:p>
+          <a:p>
+            <a:pPr marL="0" indent="0">
+              <a:buNone/>
+            </a:pPr>
+            <a:r>
+              <a:rPr lang="en-US" sz="2400" dirty="0">
                 <a:solidFill>
                   <a:srgbClr val="C00000"/>
                 </a:solidFill>
@@ -4138,25 +4170,40 @@
               <a:t>		</a:t>
             </a:r>
             <a:r>
-              <a:rPr lang="en-US" sz="2800" dirty="0">
+              <a:rPr lang="en-US" sz="2400" dirty="0">
                 <a:solidFill>
                   <a:srgbClr val="C00000"/>
                 </a:solidFill>
                 <a:latin typeface="Monaco" pitchFamily="2" charset="77"/>
               </a:rPr>
-              <a:t>&gt; git add</a:t>
-            </a:r>
+              <a:t>&gt; git add </a:t>
+            </a:r>
+            <a:r>
+              <a:rPr lang="en-US" sz="2400" dirty="0" err="1">
+                <a:solidFill>
+                  <a:srgbClr val="C00000"/>
+                </a:solidFill>
+                <a:latin typeface="Monaco" pitchFamily="2" charset="77"/>
+              </a:rPr>
+              <a:t>foo.txt</a:t>
+            </a:r>
+            <a:endParaRPr lang="en-US" sz="2400" dirty="0">
+              <a:solidFill>
+                <a:srgbClr val="C00000"/>
+              </a:solidFill>
+              <a:latin typeface="Monaco" pitchFamily="2" charset="77"/>
+            </a:endParaRPr>
           </a:p>
           <a:p>
             <a:pPr marL="0" indent="0">
               <a:buNone/>
             </a:pPr>
             <a:r>
-              <a:rPr lang="en-US" dirty="0"/>
+              <a:rPr lang="en-US" sz="2800" dirty="0"/>
               <a:t>3.2 – Saving these changes to the </a:t>
             </a:r>
             <a:r>
-              <a:rPr lang="en-US" b="1" dirty="0"/>
+              <a:rPr lang="en-US" sz="2800" b="1" dirty="0"/>
               <a:t>repository</a:t>
             </a:r>
           </a:p>
@@ -4165,7 +4212,7 @@
               <a:buNone/>
             </a:pPr>
             <a:r>
-              <a:rPr lang="en-US" sz="2800" dirty="0">
+              <a:rPr lang="en-US" sz="2400" dirty="0">
                 <a:solidFill>
                   <a:srgbClr val="C00000"/>
                 </a:solidFill>
@@ -4173,13 +4220,31 @@
               <a:t>		</a:t>
             </a:r>
             <a:r>
-              <a:rPr lang="en-US" sz="2800" dirty="0">
+              <a:rPr lang="en-US" sz="2400" dirty="0">
                 <a:solidFill>
                   <a:srgbClr val="C00000"/>
                 </a:solidFill>
                 <a:latin typeface="Monaco" pitchFamily="2" charset="77"/>
               </a:rPr>
-              <a:t>&gt; git commit</a:t>
+              <a:t>&gt; git commit –m “Add </a:t>
+            </a:r>
+            <a:r>
+              <a:rPr lang="en-US" sz="2400" dirty="0" err="1">
+                <a:solidFill>
+                  <a:srgbClr val="C00000"/>
+                </a:solidFill>
+                <a:latin typeface="Monaco" pitchFamily="2" charset="77"/>
+              </a:rPr>
+              <a:t>foo.txt</a:t>
+            </a:r>
+            <a:r>
+              <a:rPr lang="en-US" sz="2400" dirty="0">
+                <a:solidFill>
+                  <a:srgbClr val="C00000"/>
+                </a:solidFill>
+                <a:latin typeface="Monaco" pitchFamily="2" charset="77"/>
+              </a:rPr>
+              <a:t> to repo”</a:t>
             </a:r>
           </a:p>
           <a:p>
@@ -4187,7 +4252,7 @@
               <a:buNone/>
             </a:pPr>
             <a:r>
-              <a:rPr lang="en-US" dirty="0"/>
+              <a:rPr lang="en-US" sz="2800" dirty="0"/>
               <a:t>BONUS – Checking what has changed before add/commit</a:t>
             </a:r>
           </a:p>
@@ -4196,7 +4261,7 @@
               <a:buNone/>
             </a:pPr>
             <a:r>
-              <a:rPr lang="en-US" sz="2800" dirty="0">
+              <a:rPr lang="en-US" sz="2400" dirty="0">
                 <a:solidFill>
                   <a:srgbClr val="C00000"/>
                 </a:solidFill>
@@ -4204,13 +4269,87 @@
               <a:t>		</a:t>
             </a:r>
             <a:r>
-              <a:rPr lang="en-US" sz="2800" dirty="0">
+              <a:rPr lang="en-US" sz="2400" dirty="0">
                 <a:solidFill>
                   <a:srgbClr val="C00000"/>
                 </a:solidFill>
                 <a:latin typeface="Monaco" pitchFamily="2" charset="77"/>
               </a:rPr>
-              <a:t>&gt; git diff</a:t>
+              <a:t>&gt; echo hello &gt;&gt; </a:t>
+            </a:r>
+            <a:r>
+              <a:rPr lang="en-US" sz="2400" dirty="0" err="1">
+                <a:solidFill>
+                  <a:srgbClr val="C00000"/>
+                </a:solidFill>
+                <a:latin typeface="Monaco" pitchFamily="2" charset="77"/>
+              </a:rPr>
+              <a:t>foo.txt</a:t>
+            </a:r>
+            <a:r>
+              <a:rPr lang="en-US" sz="2400" dirty="0">
+                <a:solidFill>
+                  <a:srgbClr val="C00000"/>
+                </a:solidFill>
+                <a:latin typeface="Monaco" pitchFamily="2" charset="77"/>
+              </a:rPr>
+              <a:t> </a:t>
+            </a:r>
+          </a:p>
+          <a:p>
+            <a:pPr marL="0" indent="0">
+              <a:buNone/>
+            </a:pPr>
+            <a:r>
+              <a:rPr lang="en-US" sz="2400" dirty="0">
+                <a:solidFill>
+                  <a:srgbClr val="C00000"/>
+                </a:solidFill>
+                <a:latin typeface="Monaco" pitchFamily="2" charset="77"/>
+              </a:rPr>
+              <a:t>		&gt; git diff</a:t>
+            </a:r>
+          </a:p>
+          <a:p>
+            <a:pPr marL="0" indent="0">
+              <a:buNone/>
+            </a:pPr>
+            <a:r>
+              <a:rPr lang="en-US" sz="2400" dirty="0">
+                <a:solidFill>
+                  <a:srgbClr val="C00000"/>
+                </a:solidFill>
+                <a:latin typeface="Monaco" pitchFamily="2" charset="77"/>
+              </a:rPr>
+              <a:t>		&gt; git add –A</a:t>
+            </a:r>
+          </a:p>
+          <a:p>
+            <a:pPr marL="0" indent="0">
+              <a:buNone/>
+            </a:pPr>
+            <a:r>
+              <a:rPr lang="en-US" sz="2400" dirty="0">
+                <a:solidFill>
+                  <a:srgbClr val="C00000"/>
+                </a:solidFill>
+                <a:latin typeface="Monaco" pitchFamily="2" charset="77"/>
+              </a:rPr>
+              <a:t>		&gt; git commit</a:t>
+            </a:r>
+          </a:p>
+          <a:p>
+            <a:pPr marL="0" indent="0">
+              <a:buNone/>
+            </a:pPr>
+            <a:r>
+              <a:rPr lang="en-US" sz="2400" dirty="0">
+                <a:solidFill>
+                  <a:srgbClr val="C00000"/>
+                </a:solidFill>
+                <a:latin typeface="Monaco" pitchFamily="2" charset="77"/>
+              </a:rPr>
+              <a:t>		&gt; git log</a:t>
             </a:r>
           </a:p>
           <a:p>
@@ -4315,7 +4454,7 @@
               <a:rPr lang="en-US" sz="2400" dirty="0">
                 <a:latin typeface="Monaco" pitchFamily="2" charset="77"/>
               </a:rPr>
-              <a:t>&gt; git diff &amp; checkout</a:t>
+              <a:t>&gt; git diff &amp; show</a:t>
             </a:r>
           </a:p>
         </p:txBody>
@@ -4341,14 +4480,498 @@
           <a:bodyPr/>
           <a:lstStyle/>
           <a:p>
-            <a:endParaRPr lang="en-US"/>
-          </a:p>
-        </p:txBody>
-      </p:sp>
+            <a:pPr marL="0" indent="0">
+              <a:buNone/>
+            </a:pPr>
+            <a:r>
+              <a:rPr lang="en-US" dirty="0"/>
+              <a:t>4.1 – Difference between current file and N commit ago </a:t>
+            </a:r>
+          </a:p>
+          <a:p>
+            <a:pPr marL="0" indent="0">
+              <a:buNone/>
+            </a:pPr>
+            <a:r>
+              <a:rPr lang="en-US" sz="2800" dirty="0">
+                <a:solidFill>
+                  <a:srgbClr val="C00000"/>
+                </a:solidFill>
+                <a:latin typeface="Monaco" pitchFamily="2" charset="77"/>
+              </a:rPr>
+              <a:t>		&gt; git diff HEAD</a:t>
+            </a:r>
+          </a:p>
+          <a:p>
+            <a:pPr marL="0" indent="0">
+              <a:buNone/>
+            </a:pPr>
+            <a:r>
+              <a:rPr lang="en-US" sz="2800" dirty="0">
+                <a:solidFill>
+                  <a:srgbClr val="C00000"/>
+                </a:solidFill>
+                <a:latin typeface="Monaco" pitchFamily="2" charset="77"/>
+              </a:rPr>
+              <a:t>		&gt; git diff HEAD~1</a:t>
+            </a:r>
+          </a:p>
+          <a:p>
+            <a:pPr marL="0" indent="0">
+              <a:buNone/>
+            </a:pPr>
+            <a:r>
+              <a:rPr lang="en-US" sz="2800" dirty="0">
+                <a:solidFill>
+                  <a:srgbClr val="C00000"/>
+                </a:solidFill>
+                <a:latin typeface="Monaco" pitchFamily="2" charset="77"/>
+              </a:rPr>
+              <a:t>		&gt; git diff </a:t>
+            </a:r>
+            <a:r>
+              <a:rPr lang="en-US" sz="2800" dirty="0">
+                <a:solidFill>
+                  <a:srgbClr val="C00000"/>
+                </a:solidFill>
+                <a:highlight>
+                  <a:srgbClr val="FFFF00"/>
+                </a:highlight>
+                <a:latin typeface="Monaco" pitchFamily="2" charset="77"/>
+              </a:rPr>
+              <a:t>efakb1</a:t>
+            </a:r>
+            <a:r>
+              <a:rPr lang="en-US" sz="2800" dirty="0">
+                <a:solidFill>
+                  <a:srgbClr val="C00000"/>
+                </a:solidFill>
+                <a:latin typeface="Monaco" pitchFamily="2" charset="77"/>
+              </a:rPr>
+              <a:t> </a:t>
+            </a:r>
+          </a:p>
+          <a:p>
+            <a:pPr marL="0" indent="0">
+              <a:buNone/>
+            </a:pPr>
+            <a:r>
+              <a:rPr lang="en-US" dirty="0"/>
+              <a:t>4.2 – What was done in ____ commit?</a:t>
+            </a:r>
+          </a:p>
+          <a:p>
+            <a:pPr marL="0" indent="0">
+              <a:buNone/>
+            </a:pPr>
+            <a:r>
+              <a:rPr lang="en-US" sz="2800" dirty="0">
+                <a:solidFill>
+                  <a:srgbClr val="C00000"/>
+                </a:solidFill>
+                <a:latin typeface="Monaco" pitchFamily="2" charset="77"/>
+              </a:rPr>
+              <a:t>		&gt; commit show HEAD~1 </a:t>
+            </a:r>
+            <a:r>
+              <a:rPr lang="en-US" sz="2800" dirty="0" err="1">
+                <a:solidFill>
+                  <a:srgbClr val="C00000"/>
+                </a:solidFill>
+                <a:latin typeface="Monaco" pitchFamily="2" charset="77"/>
+              </a:rPr>
+              <a:t>foo.txt</a:t>
+            </a:r>
+            <a:endParaRPr lang="en-US" sz="2800" dirty="0">
+              <a:solidFill>
+                <a:srgbClr val="C00000"/>
+              </a:solidFill>
+              <a:latin typeface="Monaco" pitchFamily="2" charset="77"/>
+            </a:endParaRPr>
+          </a:p>
+        </p:txBody>
+      </p:sp>
+      <p:sp>
+        <p:nvSpPr>
+          <p:cNvPr id="4" name="Rounded Rectangle 3">
+            <a:extLst>
+              <a:ext uri="{FF2B5EF4-FFF2-40B4-BE49-F238E27FC236}">
+                <a16:creationId xmlns:a16="http://schemas.microsoft.com/office/drawing/2014/main" id="{76D51D0D-1585-F340-BD41-BE008D4106E2}"/>
+              </a:ext>
+            </a:extLst>
+          </p:cNvPr>
+          <p:cNvSpPr/>
+          <p:nvPr/>
+        </p:nvSpPr>
+        <p:spPr>
+          <a:xfrm>
+            <a:off x="6605195" y="1990164"/>
+            <a:ext cx="2528048" cy="1030045"/>
+          </a:xfrm>
+          <a:prstGeom prst="roundRect">
+            <a:avLst/>
+          </a:prstGeom>
+        </p:spPr>
+        <p:style>
+          <a:lnRef idx="2">
+            <a:schemeClr val="dk1"/>
+          </a:lnRef>
+          <a:fillRef idx="1">
+            <a:schemeClr val="lt1"/>
+          </a:fillRef>
+          <a:effectRef idx="0">
+            <a:schemeClr val="dk1"/>
+          </a:effectRef>
+          <a:fontRef idx="minor">
+            <a:schemeClr val="dk1"/>
+          </a:fontRef>
+        </p:style>
+        <p:txBody>
+          <a:bodyPr rtlCol="0" anchor="ctr"/>
+          <a:lstStyle/>
+          <a:p>
+            <a:pPr algn="ctr"/>
+            <a:r>
+              <a:rPr lang="en-US" dirty="0"/>
+              <a:t>This is different for every commit/repo, use </a:t>
+            </a:r>
+            <a:r>
+              <a:rPr lang="en-US" dirty="0">
+                <a:latin typeface="Monaco" pitchFamily="2" charset="77"/>
+              </a:rPr>
+              <a:t>git log </a:t>
+            </a:r>
+            <a:r>
+              <a:rPr lang="en-US" dirty="0"/>
+              <a:t>to check</a:t>
+            </a:r>
+          </a:p>
+        </p:txBody>
+      </p:sp>
+      <p:cxnSp>
+        <p:nvCxnSpPr>
+          <p:cNvPr id="6" name="Straight Arrow Connector 5">
+            <a:extLst>
+              <a:ext uri="{FF2B5EF4-FFF2-40B4-BE49-F238E27FC236}">
+                <a16:creationId xmlns:a16="http://schemas.microsoft.com/office/drawing/2014/main" id="{398CAE36-118C-6541-98F2-D1198D7E116E}"/>
+              </a:ext>
+            </a:extLst>
+          </p:cNvPr>
+          <p:cNvCxnSpPr>
+            <a:cxnSpLocks/>
+          </p:cNvCxnSpPr>
+          <p:nvPr/>
+        </p:nvCxnSpPr>
+        <p:spPr>
+          <a:xfrm flipH="1">
+            <a:off x="5637007" y="2659331"/>
+            <a:ext cx="968188" cy="360878"/>
+          </a:xfrm>
+          <a:prstGeom prst="straightConnector1">
+            <a:avLst/>
+          </a:prstGeom>
+          <a:ln>
+            <a:tailEnd type="triangle"/>
+          </a:ln>
+          <a:effectLst/>
+        </p:spPr>
+        <p:style>
+          <a:lnRef idx="2">
+            <a:schemeClr val="dk1"/>
+          </a:lnRef>
+          <a:fillRef idx="0">
+            <a:schemeClr val="dk1"/>
+          </a:fillRef>
+          <a:effectRef idx="1">
+            <a:schemeClr val="dk1"/>
+          </a:effectRef>
+          <a:fontRef idx="minor">
+            <a:schemeClr val="tx1"/>
+          </a:fontRef>
+        </p:style>
+      </p:cxnSp>
     </p:spTree>
     <p:extLst>
       <p:ext uri="{BB962C8B-B14F-4D97-AF65-F5344CB8AC3E}">
         <p14:creationId xmlns:p14="http://schemas.microsoft.com/office/powerpoint/2010/main" val="2069254717"/>
+      </p:ext>
+    </p:extLst>
+  </p:cSld>
+  <p:clrMapOvr>
+    <a:masterClrMapping/>
+  </p:clrMapOvr>
+</p:sld>
+</file>
+
+<file path=ppt/slides/slide9.xml><?xml version="1.0" encoding="utf-8"?>
+<p:sld xmlns:a="http://schemas.openxmlformats.org/drawingml/2006/main" xmlns:r="http://schemas.openxmlformats.org/officeDocument/2006/relationships" xmlns:p="http://schemas.openxmlformats.org/presentationml/2006/main">
+  <p:cSld>
+    <p:spTree>
+      <p:nvGrpSpPr>
+        <p:cNvPr id="1" name=""/>
+        <p:cNvGrpSpPr/>
+        <p:nvPr/>
+      </p:nvGrpSpPr>
+      <p:grpSpPr>
+        <a:xfrm>
+          <a:off x="0" y="0"/>
+          <a:ext cx="0" cy="0"/>
+          <a:chOff x="0" y="0"/>
+          <a:chExt cx="0" cy="0"/>
+        </a:xfrm>
+      </p:grpSpPr>
+      <p:sp>
+        <p:nvSpPr>
+          <p:cNvPr id="2" name="Title 1">
+            <a:extLst>
+              <a:ext uri="{FF2B5EF4-FFF2-40B4-BE49-F238E27FC236}">
+                <a16:creationId xmlns:a16="http://schemas.microsoft.com/office/drawing/2014/main" id="{DCCEBE2C-C98C-994D-897F-7CDD771F3370}"/>
+              </a:ext>
+            </a:extLst>
+          </p:cNvPr>
+          <p:cNvSpPr>
+            <a:spLocks noGrp="1"/>
+          </p:cNvSpPr>
+          <p:nvPr>
+            <p:ph type="title"/>
+          </p:nvPr>
+        </p:nvSpPr>
+        <p:spPr/>
+        <p:txBody>
+          <a:bodyPr>
+            <a:normAutofit fontScale="90000"/>
+          </a:bodyPr>
+          <a:lstStyle/>
+          <a:p>
+            <a:r>
+              <a:rPr lang="en-US" dirty="0"/>
+              <a:t>5. Reverting to a previous commit</a:t>
+            </a:r>
+            <a:br>
+              <a:rPr lang="en-US" dirty="0"/>
+            </a:br>
+            <a:r>
+              <a:rPr lang="en-US" dirty="0"/>
+              <a:t>&gt; git checkout</a:t>
+            </a:r>
+          </a:p>
+        </p:txBody>
+      </p:sp>
+      <p:sp>
+        <p:nvSpPr>
+          <p:cNvPr id="3" name="Content Placeholder 2">
+            <a:extLst>
+              <a:ext uri="{FF2B5EF4-FFF2-40B4-BE49-F238E27FC236}">
+                <a16:creationId xmlns:a16="http://schemas.microsoft.com/office/drawing/2014/main" id="{47496551-1D9F-CD4A-921F-E9A1A29DE20A}"/>
+              </a:ext>
+            </a:extLst>
+          </p:cNvPr>
+          <p:cNvSpPr>
+            <a:spLocks noGrp="1"/>
+          </p:cNvSpPr>
+          <p:nvPr>
+            <p:ph idx="1"/>
+          </p:nvPr>
+        </p:nvSpPr>
+        <p:spPr>
+          <a:xfrm>
+            <a:off x="182795" y="1248384"/>
+            <a:ext cx="11814383" cy="5518175"/>
+          </a:xfrm>
+        </p:spPr>
+        <p:txBody>
+          <a:bodyPr>
+            <a:normAutofit fontScale="92500" lnSpcReduction="10000"/>
+          </a:bodyPr>
+          <a:lstStyle/>
+          <a:p>
+            <a:pPr marL="0" indent="0">
+              <a:buNone/>
+            </a:pPr>
+            <a:r>
+              <a:rPr lang="en-US" dirty="0"/>
+              <a:t>5.1 – Going back to a specific version of a file </a:t>
+            </a:r>
+          </a:p>
+          <a:p>
+            <a:pPr marL="0" indent="0">
+              <a:buNone/>
+            </a:pPr>
+            <a:r>
+              <a:rPr lang="en-US" sz="2800" dirty="0">
+                <a:solidFill>
+                  <a:srgbClr val="C00000"/>
+                </a:solidFill>
+                <a:latin typeface="Monaco" pitchFamily="2" charset="77"/>
+              </a:rPr>
+              <a:t>		&gt; git checkout HEAD~1 </a:t>
+            </a:r>
+            <a:r>
+              <a:rPr lang="en-US" sz="2800" dirty="0" err="1">
+                <a:solidFill>
+                  <a:srgbClr val="C00000"/>
+                </a:solidFill>
+                <a:latin typeface="Monaco" pitchFamily="2" charset="77"/>
+              </a:rPr>
+              <a:t>foo.txt</a:t>
+            </a:r>
+            <a:endParaRPr lang="en-US" sz="2800" dirty="0">
+              <a:solidFill>
+                <a:srgbClr val="C00000"/>
+              </a:solidFill>
+              <a:latin typeface="Monaco" pitchFamily="2" charset="77"/>
+            </a:endParaRPr>
+          </a:p>
+          <a:p>
+            <a:pPr marL="0" indent="0">
+              <a:buNone/>
+            </a:pPr>
+            <a:r>
+              <a:rPr lang="en-US" sz="2800" dirty="0">
+                <a:solidFill>
+                  <a:srgbClr val="C00000"/>
+                </a:solidFill>
+                <a:latin typeface="Monaco" pitchFamily="2" charset="77"/>
+              </a:rPr>
+              <a:t>		&gt; cat </a:t>
+            </a:r>
+            <a:r>
+              <a:rPr lang="en-US" sz="2800" dirty="0" err="1">
+                <a:solidFill>
+                  <a:srgbClr val="C00000"/>
+                </a:solidFill>
+                <a:latin typeface="Monaco" pitchFamily="2" charset="77"/>
+              </a:rPr>
+              <a:t>foo.txt</a:t>
+            </a:r>
+            <a:endParaRPr lang="en-US" sz="2800" dirty="0">
+              <a:solidFill>
+                <a:srgbClr val="C00000"/>
+              </a:solidFill>
+              <a:latin typeface="Monaco" pitchFamily="2" charset="77"/>
+            </a:endParaRPr>
+          </a:p>
+          <a:p>
+            <a:pPr marL="0" indent="0">
+              <a:buNone/>
+            </a:pPr>
+            <a:r>
+              <a:rPr lang="en-US" sz="2800" dirty="0">
+                <a:solidFill>
+                  <a:srgbClr val="C00000"/>
+                </a:solidFill>
+                <a:latin typeface="Monaco" pitchFamily="2" charset="77"/>
+              </a:rPr>
+              <a:t>		&gt; git checkout HEAD </a:t>
+            </a:r>
+            <a:r>
+              <a:rPr lang="en-US" sz="2800" dirty="0" err="1">
+                <a:solidFill>
+                  <a:srgbClr val="C00000"/>
+                </a:solidFill>
+                <a:latin typeface="Monaco" pitchFamily="2" charset="77"/>
+              </a:rPr>
+              <a:t>foo.txt</a:t>
+            </a:r>
+            <a:r>
+              <a:rPr lang="en-US" sz="2800" dirty="0">
+                <a:solidFill>
+                  <a:srgbClr val="C00000"/>
+                </a:solidFill>
+                <a:latin typeface="Monaco" pitchFamily="2" charset="77"/>
+              </a:rPr>
+              <a:t> </a:t>
+            </a:r>
+          </a:p>
+          <a:p>
+            <a:pPr marL="0" indent="0">
+              <a:buNone/>
+            </a:pPr>
+            <a:endParaRPr lang="en-US" dirty="0"/>
+          </a:p>
+          <a:p>
+            <a:pPr marL="0" indent="0">
+              <a:buNone/>
+            </a:pPr>
+            <a:r>
+              <a:rPr lang="en-US" dirty="0"/>
+              <a:t>5.2 Going back to an entire commit - Detached HEAD </a:t>
+            </a:r>
+            <a:r>
+              <a:rPr lang="en-US" b="1" dirty="0">
+                <a:highlight>
+                  <a:srgbClr val="FFFF00"/>
+                </a:highlight>
+              </a:rPr>
+              <a:t>(CAUTION)</a:t>
+            </a:r>
+          </a:p>
+          <a:p>
+            <a:pPr marL="0" indent="0">
+              <a:buNone/>
+            </a:pPr>
+            <a:r>
+              <a:rPr lang="en-US" sz="2800" dirty="0">
+                <a:solidFill>
+                  <a:srgbClr val="C00000"/>
+                </a:solidFill>
+                <a:latin typeface="Monaco" pitchFamily="2" charset="77"/>
+              </a:rPr>
+              <a:t>		&gt; git checkout HEAD~1</a:t>
+            </a:r>
+          </a:p>
+          <a:p>
+            <a:pPr marL="0" indent="0">
+              <a:buNone/>
+            </a:pPr>
+            <a:endParaRPr lang="en-US" sz="2800" dirty="0">
+              <a:solidFill>
+                <a:srgbClr val="C00000"/>
+              </a:solidFill>
+              <a:latin typeface="Monaco" pitchFamily="2" charset="77"/>
+            </a:endParaRPr>
+          </a:p>
+          <a:p>
+            <a:pPr marL="0" indent="0">
+              <a:buNone/>
+            </a:pPr>
+            <a:r>
+              <a:rPr lang="en-US" sz="3500" dirty="0">
+                <a:latin typeface="Helvetica" pitchFamily="2" charset="0"/>
+              </a:rPr>
+              <a:t>IF you checkout a previous commit without first committing your current state, then anything not committed would be lost!!!</a:t>
+            </a:r>
+          </a:p>
+          <a:p>
+            <a:pPr marL="0" indent="0">
+              <a:buNone/>
+            </a:pPr>
+            <a:r>
+              <a:rPr lang="en-US" sz="2800" dirty="0">
+                <a:solidFill>
+                  <a:srgbClr val="C00000"/>
+                </a:solidFill>
+                <a:latin typeface="Monaco" pitchFamily="2" charset="77"/>
+              </a:rPr>
+              <a:t>		&gt; git checkout HEAD</a:t>
+            </a:r>
+          </a:p>
+          <a:p>
+            <a:pPr marL="0" indent="0">
+              <a:buNone/>
+            </a:pPr>
+            <a:endParaRPr lang="en-US" b="1" dirty="0">
+              <a:highlight>
+                <a:srgbClr val="FFFF00"/>
+              </a:highlight>
+            </a:endParaRPr>
+          </a:p>
+        </p:txBody>
+      </p:sp>
+    </p:spTree>
+    <p:extLst>
+      <p:ext uri="{BB962C8B-B14F-4D97-AF65-F5344CB8AC3E}">
+        <p14:creationId xmlns:p14="http://schemas.microsoft.com/office/powerpoint/2010/main" val="2408537366"/>
       </p:ext>
     </p:extLst>
   </p:cSld>

</xml_diff>